<commit_message>
lesson: face detection 1st draft done
</commit_message>
<xml_diff>
--- a/課程資料/人臉特徵與濾鏡貼紙/課程圖片.pptx
+++ b/課程資料/人臉特徵與濾鏡貼紙/課程圖片.pptx
@@ -264,7 +264,7 @@
           <a:p>
             <a:fld id="{BD382436-262A-4B6D-9775-F617214CF2A4}" type="datetimeFigureOut">
               <a:rPr lang="zh-TW" altLang="en-US" smtClean="0"/>
-              <a:t>2023/4/10</a:t>
+              <a:t>2023/4/11</a:t>
             </a:fld>
             <a:endParaRPr lang="zh-TW" altLang="en-US"/>
           </a:p>
@@ -462,7 +462,7 @@
           <a:p>
             <a:fld id="{BD382436-262A-4B6D-9775-F617214CF2A4}" type="datetimeFigureOut">
               <a:rPr lang="zh-TW" altLang="en-US" smtClean="0"/>
-              <a:t>2023/4/10</a:t>
+              <a:t>2023/4/11</a:t>
             </a:fld>
             <a:endParaRPr lang="zh-TW" altLang="en-US"/>
           </a:p>
@@ -670,7 +670,7 @@
           <a:p>
             <a:fld id="{BD382436-262A-4B6D-9775-F617214CF2A4}" type="datetimeFigureOut">
               <a:rPr lang="zh-TW" altLang="en-US" smtClean="0"/>
-              <a:t>2023/4/10</a:t>
+              <a:t>2023/4/11</a:t>
             </a:fld>
             <a:endParaRPr lang="zh-TW" altLang="en-US"/>
           </a:p>
@@ -868,7 +868,7 @@
           <a:p>
             <a:fld id="{BD382436-262A-4B6D-9775-F617214CF2A4}" type="datetimeFigureOut">
               <a:rPr lang="zh-TW" altLang="en-US" smtClean="0"/>
-              <a:t>2023/4/10</a:t>
+              <a:t>2023/4/11</a:t>
             </a:fld>
             <a:endParaRPr lang="zh-TW" altLang="en-US"/>
           </a:p>
@@ -1143,7 +1143,7 @@
           <a:p>
             <a:fld id="{BD382436-262A-4B6D-9775-F617214CF2A4}" type="datetimeFigureOut">
               <a:rPr lang="zh-TW" altLang="en-US" smtClean="0"/>
-              <a:t>2023/4/10</a:t>
+              <a:t>2023/4/11</a:t>
             </a:fld>
             <a:endParaRPr lang="zh-TW" altLang="en-US"/>
           </a:p>
@@ -1408,7 +1408,7 @@
           <a:p>
             <a:fld id="{BD382436-262A-4B6D-9775-F617214CF2A4}" type="datetimeFigureOut">
               <a:rPr lang="zh-TW" altLang="en-US" smtClean="0"/>
-              <a:t>2023/4/10</a:t>
+              <a:t>2023/4/11</a:t>
             </a:fld>
             <a:endParaRPr lang="zh-TW" altLang="en-US"/>
           </a:p>
@@ -1820,7 +1820,7 @@
           <a:p>
             <a:fld id="{BD382436-262A-4B6D-9775-F617214CF2A4}" type="datetimeFigureOut">
               <a:rPr lang="zh-TW" altLang="en-US" smtClean="0"/>
-              <a:t>2023/4/10</a:t>
+              <a:t>2023/4/11</a:t>
             </a:fld>
             <a:endParaRPr lang="zh-TW" altLang="en-US"/>
           </a:p>
@@ -1961,7 +1961,7 @@
           <a:p>
             <a:fld id="{BD382436-262A-4B6D-9775-F617214CF2A4}" type="datetimeFigureOut">
               <a:rPr lang="zh-TW" altLang="en-US" smtClean="0"/>
-              <a:t>2023/4/10</a:t>
+              <a:t>2023/4/11</a:t>
             </a:fld>
             <a:endParaRPr lang="zh-TW" altLang="en-US"/>
           </a:p>
@@ -2074,7 +2074,7 @@
           <a:p>
             <a:fld id="{BD382436-262A-4B6D-9775-F617214CF2A4}" type="datetimeFigureOut">
               <a:rPr lang="zh-TW" altLang="en-US" smtClean="0"/>
-              <a:t>2023/4/10</a:t>
+              <a:t>2023/4/11</a:t>
             </a:fld>
             <a:endParaRPr lang="zh-TW" altLang="en-US"/>
           </a:p>
@@ -2385,7 +2385,7 @@
           <a:p>
             <a:fld id="{BD382436-262A-4B6D-9775-F617214CF2A4}" type="datetimeFigureOut">
               <a:rPr lang="zh-TW" altLang="en-US" smtClean="0"/>
-              <a:t>2023/4/10</a:t>
+              <a:t>2023/4/11</a:t>
             </a:fld>
             <a:endParaRPr lang="zh-TW" altLang="en-US"/>
           </a:p>
@@ -2673,7 +2673,7 @@
           <a:p>
             <a:fld id="{BD382436-262A-4B6D-9775-F617214CF2A4}" type="datetimeFigureOut">
               <a:rPr lang="zh-TW" altLang="en-US" smtClean="0"/>
-              <a:t>2023/4/10</a:t>
+              <a:t>2023/4/11</a:t>
             </a:fld>
             <a:endParaRPr lang="zh-TW" altLang="en-US"/>
           </a:p>
@@ -2914,7 +2914,7 @@
           <a:p>
             <a:fld id="{BD382436-262A-4B6D-9775-F617214CF2A4}" type="datetimeFigureOut">
               <a:rPr lang="zh-TW" altLang="en-US" smtClean="0"/>
-              <a:t>2023/4/10</a:t>
+              <a:t>2023/4/11</a:t>
             </a:fld>
             <a:endParaRPr lang="zh-TW" altLang="en-US"/>
           </a:p>
@@ -4572,10 +4572,10 @@
       </p:grpSpPr>
       <p:pic>
         <p:nvPicPr>
-          <p:cNvPr id="7" name="圖片 6">
-            <a:extLst>
-              <a:ext uri="{FF2B5EF4-FFF2-40B4-BE49-F238E27FC236}">
-                <a16:creationId xmlns:a16="http://schemas.microsoft.com/office/drawing/2014/main" id="{35EC2928-775B-4E89-BE49-D2806F4D2072}"/>
+          <p:cNvPr id="3" name="圖片 2">
+            <a:extLst>
+              <a:ext uri="{FF2B5EF4-FFF2-40B4-BE49-F238E27FC236}">
+                <a16:creationId xmlns:a16="http://schemas.microsoft.com/office/drawing/2014/main" id="{0FD99221-5500-45F7-8E3F-16DC12E3D7FB}"/>
               </a:ext>
             </a:extLst>
           </p:cNvPr>
@@ -4585,19 +4585,187 @@
           <p:nvPr/>
         </p:nvPicPr>
         <p:blipFill>
-          <a:blip r:embed="rId2"/>
+          <a:blip r:embed="rId2">
+            <a:extLst>
+              <a:ext uri="{28A0092B-C50C-407E-A947-70E740481C1C}">
+                <a14:useLocalDpi xmlns:a14="http://schemas.microsoft.com/office/drawing/2010/main" val="0"/>
+              </a:ext>
+            </a:extLst>
+          </a:blip>
           <a:stretch>
             <a:fillRect/>
           </a:stretch>
         </p:blipFill>
         <p:spPr>
           <a:xfrm>
-            <a:off x="0" y="0"/>
-            <a:ext cx="12192000" cy="6858000"/>
+            <a:off x="999968" y="1794991"/>
+            <a:ext cx="2094925" cy="1879014"/>
           </a:xfrm>
           <a:prstGeom prst="rect">
             <a:avLst/>
           </a:prstGeom>
+          <a:ln w="3175" cap="sq">
+            <a:solidFill>
+              <a:srgbClr val="000000"/>
+            </a:solidFill>
+            <a:prstDash val="solid"/>
+            <a:miter lim="800000"/>
+          </a:ln>
+          <a:effectLst>
+            <a:outerShdw blurRad="50800" dist="38100" dir="2700000" algn="tl" rotWithShape="0">
+              <a:srgbClr val="000000">
+                <a:alpha val="43000"/>
+              </a:srgbClr>
+            </a:outerShdw>
+          </a:effectLst>
+        </p:spPr>
+      </p:pic>
+      <p:pic>
+        <p:nvPicPr>
+          <p:cNvPr id="5" name="圖片 4">
+            <a:extLst>
+              <a:ext uri="{FF2B5EF4-FFF2-40B4-BE49-F238E27FC236}">
+                <a16:creationId xmlns:a16="http://schemas.microsoft.com/office/drawing/2014/main" id="{CB57672A-BB60-45E2-9128-C5E3E4270B5A}"/>
+              </a:ext>
+            </a:extLst>
+          </p:cNvPr>
+          <p:cNvPicPr>
+            <a:picLocks noChangeAspect="1"/>
+          </p:cNvPicPr>
+          <p:nvPr/>
+        </p:nvPicPr>
+        <p:blipFill rotWithShape="1">
+          <a:blip r:embed="rId3">
+            <a:extLst>
+              <a:ext uri="{28A0092B-C50C-407E-A947-70E740481C1C}">
+                <a14:useLocalDpi xmlns:a14="http://schemas.microsoft.com/office/drawing/2010/main" val="0"/>
+              </a:ext>
+            </a:extLst>
+          </a:blip>
+          <a:srcRect l="11862" t="12965" r="15423" b="11056"/>
+          <a:stretch/>
+        </p:blipFill>
+        <p:spPr>
+          <a:xfrm>
+            <a:off x="3228616" y="1794991"/>
+            <a:ext cx="2094926" cy="1908758"/>
+          </a:xfrm>
+          <a:prstGeom prst="rect">
+            <a:avLst/>
+          </a:prstGeom>
+          <a:ln w="3175" cap="sq">
+            <a:solidFill>
+              <a:srgbClr val="000000"/>
+            </a:solidFill>
+            <a:prstDash val="solid"/>
+            <a:miter lim="800000"/>
+          </a:ln>
+          <a:effectLst>
+            <a:outerShdw blurRad="50800" dist="38100" dir="2700000" algn="tl" rotWithShape="0">
+              <a:srgbClr val="000000">
+                <a:alpha val="43000"/>
+              </a:srgbClr>
+            </a:outerShdw>
+          </a:effectLst>
+        </p:spPr>
+      </p:pic>
+      <p:pic>
+        <p:nvPicPr>
+          <p:cNvPr id="8" name="圖片 7">
+            <a:extLst>
+              <a:ext uri="{FF2B5EF4-FFF2-40B4-BE49-F238E27FC236}">
+                <a16:creationId xmlns:a16="http://schemas.microsoft.com/office/drawing/2014/main" id="{68C1D6CE-60BE-4A44-B397-786586172415}"/>
+              </a:ext>
+            </a:extLst>
+          </p:cNvPr>
+          <p:cNvPicPr>
+            <a:picLocks noChangeAspect="1"/>
+          </p:cNvPicPr>
+          <p:nvPr/>
+        </p:nvPicPr>
+        <p:blipFill>
+          <a:blip r:embed="rId4">
+            <a:extLst>
+              <a:ext uri="{28A0092B-C50C-407E-A947-70E740481C1C}">
+                <a14:useLocalDpi xmlns:a14="http://schemas.microsoft.com/office/drawing/2010/main" val="0"/>
+              </a:ext>
+            </a:extLst>
+          </a:blip>
+          <a:stretch>
+            <a:fillRect/>
+          </a:stretch>
+        </p:blipFill>
+        <p:spPr>
+          <a:xfrm>
+            <a:off x="5457265" y="1774739"/>
+            <a:ext cx="2094925" cy="1943994"/>
+          </a:xfrm>
+          <a:prstGeom prst="rect">
+            <a:avLst/>
+          </a:prstGeom>
+          <a:ln w="3175" cap="sq">
+            <a:solidFill>
+              <a:srgbClr val="000000"/>
+            </a:solidFill>
+            <a:prstDash val="solid"/>
+            <a:miter lim="800000"/>
+          </a:ln>
+          <a:effectLst>
+            <a:outerShdw blurRad="50800" dist="38100" dir="2700000" algn="tl" rotWithShape="0">
+              <a:srgbClr val="000000">
+                <a:alpha val="43000"/>
+              </a:srgbClr>
+            </a:outerShdw>
+          </a:effectLst>
+        </p:spPr>
+      </p:pic>
+      <p:pic>
+        <p:nvPicPr>
+          <p:cNvPr id="10" name="圖片 9">
+            <a:extLst>
+              <a:ext uri="{FF2B5EF4-FFF2-40B4-BE49-F238E27FC236}">
+                <a16:creationId xmlns:a16="http://schemas.microsoft.com/office/drawing/2014/main" id="{27B66EA0-6E2C-494A-BAF8-F871CDC4717B}"/>
+              </a:ext>
+            </a:extLst>
+          </p:cNvPr>
+          <p:cNvPicPr>
+            <a:picLocks noChangeAspect="1"/>
+          </p:cNvPicPr>
+          <p:nvPr/>
+        </p:nvPicPr>
+        <p:blipFill rotWithShape="1">
+          <a:blip r:embed="rId5">
+            <a:extLst>
+              <a:ext uri="{28A0092B-C50C-407E-A947-70E740481C1C}">
+                <a14:useLocalDpi xmlns:a14="http://schemas.microsoft.com/office/drawing/2010/main" val="0"/>
+              </a:ext>
+            </a:extLst>
+          </a:blip>
+          <a:srcRect l="9244" r="7836"/>
+          <a:stretch/>
+        </p:blipFill>
+        <p:spPr>
+          <a:xfrm>
+            <a:off x="7685913" y="1774740"/>
+            <a:ext cx="2094925" cy="1905098"/>
+          </a:xfrm>
+          <a:prstGeom prst="rect">
+            <a:avLst/>
+          </a:prstGeom>
+          <a:ln w="3175" cap="sq">
+            <a:solidFill>
+              <a:srgbClr val="000000"/>
+            </a:solidFill>
+            <a:prstDash val="solid"/>
+            <a:miter lim="800000"/>
+          </a:ln>
+          <a:effectLst>
+            <a:outerShdw blurRad="50800" dist="38100" dir="2700000" algn="tl" rotWithShape="0">
+              <a:srgbClr val="000000">
+                <a:alpha val="43000"/>
+              </a:srgbClr>
+            </a:outerShdw>
+          </a:effectLst>
         </p:spPr>
       </p:pic>
     </p:spTree>
@@ -4630,6 +4798,50 @@
           <a:chExt cx="0" cy="0"/>
         </a:xfrm>
       </p:grpSpPr>
+      <p:pic>
+        <p:nvPicPr>
+          <p:cNvPr id="2" name="圖片 1">
+            <a:extLst>
+              <a:ext uri="{FF2B5EF4-FFF2-40B4-BE49-F238E27FC236}">
+                <a16:creationId xmlns:a16="http://schemas.microsoft.com/office/drawing/2014/main" id="{52B36433-4613-4313-95DA-A751DC3D747D}"/>
+              </a:ext>
+            </a:extLst>
+          </p:cNvPr>
+          <p:cNvPicPr>
+            <a:picLocks noChangeAspect="1"/>
+          </p:cNvPicPr>
+          <p:nvPr/>
+        </p:nvPicPr>
+        <p:blipFill>
+          <a:blip r:embed="rId2"/>
+          <a:stretch>
+            <a:fillRect/>
+          </a:stretch>
+        </p:blipFill>
+        <p:spPr>
+          <a:xfrm>
+            <a:off x="4480286" y="1787640"/>
+            <a:ext cx="3231427" cy="3282719"/>
+          </a:xfrm>
+          <a:prstGeom prst="rect">
+            <a:avLst/>
+          </a:prstGeom>
+          <a:ln w="3175" cap="sq">
+            <a:solidFill>
+              <a:srgbClr val="000000"/>
+            </a:solidFill>
+            <a:prstDash val="solid"/>
+            <a:miter lim="800000"/>
+          </a:ln>
+          <a:effectLst>
+            <a:outerShdw blurRad="50800" dist="38100" dir="2700000" algn="tl" rotWithShape="0">
+              <a:srgbClr val="000000">
+                <a:alpha val="43000"/>
+              </a:srgbClr>
+            </a:outerShdw>
+          </a:effectLst>
+        </p:spPr>
+      </p:pic>
     </p:spTree>
     <p:extLst>
       <p:ext uri="{BB962C8B-B14F-4D97-AF65-F5344CB8AC3E}">

</xml_diff>